<commit_message>
Added split apply combine slide
</commit_message>
<xml_diff>
--- a/PyConf Workshop on Ray.pptx
+++ b/PyConf Workshop on Ray.pptx
@@ -7,56 +7,50 @@
     <p:sldMasterId id="2147483669" r:id="rId3"/>
   </p:sldMasterIdLst>
   <p:notesMasterIdLst>
-    <p:notesMasterId r:id="rId15"/>
+    <p:notesMasterId r:id="rId16"/>
   </p:notesMasterIdLst>
   <p:sldIdLst>
     <p:sldId id="257" r:id="rId4"/>
     <p:sldId id="258" r:id="rId5"/>
     <p:sldId id="259" r:id="rId6"/>
-    <p:sldId id="260" r:id="rId7"/>
-    <p:sldId id="261" r:id="rId8"/>
+    <p:sldId id="261" r:id="rId7"/>
+    <p:sldId id="268" r:id="rId8"/>
     <p:sldId id="262" r:id="rId9"/>
     <p:sldId id="263" r:id="rId10"/>
     <p:sldId id="264" r:id="rId11"/>
     <p:sldId id="265" r:id="rId12"/>
     <p:sldId id="266" r:id="rId13"/>
     <p:sldId id="267" r:id="rId14"/>
+    <p:sldId id="260" r:id="rId15"/>
   </p:sldIdLst>
   <p:sldSz cx="12192000" cy="6858000"/>
   <p:notesSz cx="6858000" cy="9144000"/>
   <p:embeddedFontLst>
     <p:embeddedFont>
-      <p:font typeface="Meiryo" panose="020B0604030504040204" pitchFamily="34" charset="-128"/>
-      <p:regular r:id="rId16"/>
-      <p:bold r:id="rId17"/>
-    </p:embeddedFont>
-    <p:embeddedFont>
-      <p:font typeface="Calibri" panose="020F0502020204030204" pitchFamily="34" charset="0"/>
-      <p:regular r:id="rId18"/>
-      <p:bold r:id="rId19"/>
-      <p:italic r:id="rId20"/>
-      <p:boldItalic r:id="rId21"/>
-    </p:embeddedFont>
-    <p:embeddedFont>
       <p:font typeface="Corbel" panose="020B0503020204020204" pitchFamily="34" charset="0"/>
-      <p:regular r:id="rId22"/>
-      <p:bold r:id="rId23"/>
-      <p:italic r:id="rId24"/>
-      <p:boldItalic r:id="rId25"/>
+      <p:regular r:id="rId17"/>
+      <p:bold r:id="rId18"/>
+      <p:italic r:id="rId19"/>
+      <p:boldItalic r:id="rId20"/>
     </p:embeddedFont>
     <p:embeddedFont>
       <p:font typeface="Inter" panose="020B0604020202020204" charset="0"/>
-      <p:regular r:id="rId26"/>
-      <p:bold r:id="rId27"/>
-      <p:italic r:id="rId28"/>
-      <p:boldItalic r:id="rId29"/>
+      <p:regular r:id="rId21"/>
+      <p:bold r:id="rId22"/>
+      <p:italic r:id="rId23"/>
+      <p:boldItalic r:id="rId24"/>
     </p:embeddedFont>
     <p:embeddedFont>
       <p:font typeface="Inter Medium" panose="020B0604020202020204" charset="0"/>
-      <p:regular r:id="rId30"/>
-      <p:bold r:id="rId31"/>
-      <p:italic r:id="rId32"/>
-      <p:boldItalic r:id="rId33"/>
+      <p:regular r:id="rId25"/>
+      <p:bold r:id="rId26"/>
+      <p:italic r:id="rId27"/>
+      <p:boldItalic r:id="rId28"/>
+    </p:embeddedFont>
+    <p:embeddedFont>
+      <p:font typeface="Meiryo" panose="020B0604030504040204" pitchFamily="34" charset="-128"/>
+      <p:regular r:id="rId29"/>
+      <p:bold r:id="rId30"/>
     </p:embeddedFont>
   </p:embeddedFontLst>
   <p:defaultTextStyle>
@@ -289,8 +283,11 @@
     </a:lvl9pPr>
   </p:defaultTextStyle>
   <p:extLst>
+    <p:ext uri="{EFAFB233-063F-42B5-8137-9DF3F51BA10A}">
+      <p15:sldGuideLst xmlns:p15="http://schemas.microsoft.com/office/powerpoint/2012/main"/>
+    </p:ext>
     <p:ext uri="GoogleSlidesCustomDataVersion2">
-      <go:slidesCustomData xmlns:go="http://customooxmlschemas.google.com/" xmlns:ahyp="http://schemas.microsoft.com/office/drawing/2018/hyperlinkcolor" xmlns:p15="http://schemas.microsoft.com/office/powerpoint/2012/main" xmlns:p14="http://schemas.microsoft.com/office/powerpoint/2010/main" xmlns:com="http://schemas.openxmlformats.org/drawingml/2006/compatibility" xmlns:pvml="urn:schemas-microsoft-com:office:powerpoint" xmlns:v="urn:schemas-microsoft-com:vml" xmlns:o="urn:schemas-microsoft-com:office:office" xmlns:dgm="http://schemas.openxmlformats.org/drawingml/2006/diagram" xmlns:c="http://schemas.openxmlformats.org/drawingml/2006/chart" xmlns:mv="urn:schemas-microsoft-com:mac:vml" xmlns:mc="http://schemas.openxmlformats.org/markup-compatibility/2006" xmlns="" r:id="rId36" roundtripDataSignature="AMtx7mgpY3634fFmQLUsWBlEP2QxiYKWDQ=="/>
+      <go:slidesCustomData xmlns="" xmlns:mc="http://schemas.openxmlformats.org/markup-compatibility/2006" xmlns:mv="urn:schemas-microsoft-com:mac:vml" xmlns:c="http://schemas.openxmlformats.org/drawingml/2006/chart" xmlns:dgm="http://schemas.openxmlformats.org/drawingml/2006/diagram" xmlns:o="urn:schemas-microsoft-com:office:office" xmlns:v="urn:schemas-microsoft-com:vml" xmlns:pvml="urn:schemas-microsoft-com:office:powerpoint" xmlns:com="http://schemas.openxmlformats.org/drawingml/2006/compatibility" xmlns:p14="http://schemas.microsoft.com/office/powerpoint/2010/main" xmlns:p15="http://schemas.microsoft.com/office/powerpoint/2012/main" xmlns:ahyp="http://schemas.microsoft.com/office/drawing/2018/hyperlinkcolor" xmlns:go="http://customooxmlschemas.google.com/" r:id="rId36" roundtripDataSignature="AMtx7mgpY3634fFmQLUsWBlEP2QxiYKWDQ=="/>
     </p:ext>
   </p:extLst>
 </p:presentation>
@@ -1858,7 +1855,7 @@
   <p:cSld>
     <p:spTree>
       <p:nvGrpSpPr>
-        <p:cNvPr id="1" name="Shape 1047"/>
+        <p:cNvPr id="1" name="Shape 1058"/>
         <p:cNvGrpSpPr/>
         <p:nvPr/>
       </p:nvGrpSpPr>
@@ -1872,7 +1869,7 @@
       </p:grpSpPr>
       <p:sp>
         <p:nvSpPr>
-          <p:cNvPr id="1048" name="Google Shape;1048;p13:notes"/>
+          <p:cNvPr id="1059" name="Google Shape;1059;p10:notes"/>
           <p:cNvSpPr txBox="1">
             <a:spLocks noGrp="1"/>
           </p:cNvSpPr>
@@ -1918,7 +1915,7 @@
       </p:sp>
       <p:sp>
         <p:nvSpPr>
-          <p:cNvPr id="1049" name="Google Shape;1049;p13:notes"/>
+          <p:cNvPr id="1060" name="Google Shape;1060;p10:notes"/>
           <p:cNvSpPr>
             <a:spLocks noGrp="1" noRot="1" noChangeAspect="1"/>
           </p:cNvSpPr>
@@ -1980,7 +1977,7 @@
   <p:cSld>
     <p:spTree>
       <p:nvGrpSpPr>
-        <p:cNvPr id="1" name="Shape 1058"/>
+        <p:cNvPr id="1" name="Shape 993"/>
         <p:cNvGrpSpPr/>
         <p:nvPr/>
       </p:nvGrpSpPr>
@@ -1994,53 +1991,7 @@
       </p:grpSpPr>
       <p:sp>
         <p:nvSpPr>
-          <p:cNvPr id="1059" name="Google Shape;1059;p10:notes"/>
-          <p:cNvSpPr txBox="1">
-            <a:spLocks noGrp="1"/>
-          </p:cNvSpPr>
-          <p:nvPr>
-            <p:ph type="body" idx="1"/>
-          </p:nvPr>
-        </p:nvSpPr>
-        <p:spPr>
-          <a:xfrm>
-            <a:off x="685800" y="4400550"/>
-            <a:ext cx="5486400" cy="3600450"/>
-          </a:xfrm>
-          <a:prstGeom prst="rect">
-            <a:avLst/>
-          </a:prstGeom>
-          <a:noFill/>
-          <a:ln>
-            <a:noFill/>
-          </a:ln>
-        </p:spPr>
-        <p:txBody>
-          <a:bodyPr spcFirstLastPara="1" wrap="square" lIns="91425" tIns="45700" rIns="91425" bIns="45700" anchor="t" anchorCtr="0">
-            <a:noAutofit/>
-          </a:bodyPr>
-          <a:lstStyle/>
-          <a:p>
-            <a:pPr marL="0" lvl="0" indent="0" algn="l" rtl="0">
-              <a:lnSpc>
-                <a:spcPct val="100000"/>
-              </a:lnSpc>
-              <a:spcBef>
-                <a:spcPts val="0"/>
-              </a:spcBef>
-              <a:spcAft>
-                <a:spcPts val="0"/>
-              </a:spcAft>
-              <a:buSzPts val="1400"/>
-              <a:buNone/>
-            </a:pPr>
-            <a:endParaRPr/>
-          </a:p>
-        </p:txBody>
-      </p:sp>
-      <p:sp>
-        <p:nvSpPr>
-          <p:cNvPr id="1060" name="Google Shape;1060;p10:notes"/>
+          <p:cNvPr id="994" name="Google Shape;994;p8:notes"/>
           <p:cNvSpPr>
             <a:spLocks noGrp="1" noRot="1" noChangeAspect="1"/>
           </p:cNvSpPr>
@@ -2088,6 +2039,114 @@
             <a:tailEnd type="none" w="sm" len="sm"/>
           </a:ln>
         </p:spPr>
+      </p:sp>
+      <p:sp>
+        <p:nvSpPr>
+          <p:cNvPr id="995" name="Google Shape;995;p8:notes"/>
+          <p:cNvSpPr txBox="1">
+            <a:spLocks noGrp="1"/>
+          </p:cNvSpPr>
+          <p:nvPr>
+            <p:ph type="body" idx="1"/>
+          </p:nvPr>
+        </p:nvSpPr>
+        <p:spPr>
+          <a:xfrm>
+            <a:off x="685800" y="4400550"/>
+            <a:ext cx="5486400" cy="3600450"/>
+          </a:xfrm>
+          <a:prstGeom prst="rect">
+            <a:avLst/>
+          </a:prstGeom>
+          <a:noFill/>
+          <a:ln>
+            <a:noFill/>
+          </a:ln>
+        </p:spPr>
+        <p:txBody>
+          <a:bodyPr spcFirstLastPara="1" wrap="square" lIns="91425" tIns="45700" rIns="91425" bIns="45700" anchor="t" anchorCtr="0">
+            <a:noAutofit/>
+          </a:bodyPr>
+          <a:lstStyle/>
+          <a:p>
+            <a:pPr marL="0" lvl="0" indent="0" algn="l" rtl="0">
+              <a:lnSpc>
+                <a:spcPct val="100000"/>
+              </a:lnSpc>
+              <a:spcBef>
+                <a:spcPts val="0"/>
+              </a:spcBef>
+              <a:spcAft>
+                <a:spcPts val="0"/>
+              </a:spcAft>
+              <a:buSzPts val="1400"/>
+              <a:buNone/>
+            </a:pPr>
+            <a:r>
+              <a:rPr lang="en-US" b="0" i="0">
+                <a:solidFill>
+                  <a:srgbClr val="F1F2F4"/>
+                </a:solidFill>
+                <a:latin typeface="Inter"/>
+                <a:ea typeface="Inter"/>
+                <a:cs typeface="Inter"/>
+                <a:sym typeface="Inter"/>
+              </a:rPr>
+              <a:t>A Ray cluster consists of a single head node and any number of connected worker nodes</a:t>
+            </a:r>
+            <a:endParaRPr/>
+          </a:p>
+        </p:txBody>
+      </p:sp>
+      <p:sp>
+        <p:nvSpPr>
+          <p:cNvPr id="996" name="Google Shape;996;p8:notes"/>
+          <p:cNvSpPr txBox="1">
+            <a:spLocks noGrp="1"/>
+          </p:cNvSpPr>
+          <p:nvPr>
+            <p:ph type="sldNum" idx="12"/>
+          </p:nvPr>
+        </p:nvSpPr>
+        <p:spPr>
+          <a:xfrm>
+            <a:off x="3884613" y="8685213"/>
+            <a:ext cx="2971800" cy="458787"/>
+          </a:xfrm>
+          <a:prstGeom prst="rect">
+            <a:avLst/>
+          </a:prstGeom>
+          <a:noFill/>
+          <a:ln>
+            <a:noFill/>
+          </a:ln>
+        </p:spPr>
+        <p:txBody>
+          <a:bodyPr spcFirstLastPara="1" wrap="square" lIns="91425" tIns="45700" rIns="91425" bIns="45700" anchor="b" anchorCtr="0">
+            <a:noAutofit/>
+          </a:bodyPr>
+          <a:lstStyle/>
+          <a:p>
+            <a:pPr marL="0" lvl="0" indent="0" algn="r" rtl="0">
+              <a:lnSpc>
+                <a:spcPct val="100000"/>
+              </a:lnSpc>
+              <a:spcBef>
+                <a:spcPts val="0"/>
+              </a:spcBef>
+              <a:spcAft>
+                <a:spcPts val="0"/>
+              </a:spcAft>
+              <a:buSzPts val="1400"/>
+              <a:buNone/>
+            </a:pPr>
+            <a:fld id="{00000000-1234-1234-1234-123412341234}" type="slidenum">
+              <a:rPr lang="en-US"/>
+              <a:t>12</a:t>
+            </a:fld>
+            <a:endParaRPr/>
+          </a:p>
+        </p:txBody>
       </p:sp>
     </p:spTree>
   </p:cSld>
@@ -2310,190 +2369,6 @@
   <p:cSld>
     <p:spTree>
       <p:nvGrpSpPr>
-        <p:cNvPr id="1" name="Shape 993"/>
-        <p:cNvGrpSpPr/>
-        <p:nvPr/>
-      </p:nvGrpSpPr>
-      <p:grpSpPr>
-        <a:xfrm>
-          <a:off x="0" y="0"/>
-          <a:ext cx="0" cy="0"/>
-          <a:chOff x="0" y="0"/>
-          <a:chExt cx="0" cy="0"/>
-        </a:xfrm>
-      </p:grpSpPr>
-      <p:sp>
-        <p:nvSpPr>
-          <p:cNvPr id="994" name="Google Shape;994;p8:notes"/>
-          <p:cNvSpPr>
-            <a:spLocks noGrp="1" noRot="1" noChangeAspect="1"/>
-          </p:cNvSpPr>
-          <p:nvPr>
-            <p:ph type="sldImg" idx="2"/>
-          </p:nvPr>
-        </p:nvSpPr>
-        <p:spPr>
-          <a:xfrm>
-            <a:off x="685800" y="1143000"/>
-            <a:ext cx="5486400" cy="3086100"/>
-          </a:xfrm>
-          <a:custGeom>
-            <a:avLst/>
-            <a:gdLst/>
-            <a:ahLst/>
-            <a:cxnLst/>
-            <a:rect l="l" t="t" r="r" b="b"/>
-            <a:pathLst>
-              <a:path w="120000" h="120000" extrusionOk="0">
-                <a:moveTo>
-                  <a:pt x="0" y="0"/>
-                </a:moveTo>
-                <a:lnTo>
-                  <a:pt x="120000" y="0"/>
-                </a:lnTo>
-                <a:lnTo>
-                  <a:pt x="120000" y="120000"/>
-                </a:lnTo>
-                <a:lnTo>
-                  <a:pt x="0" y="120000"/>
-                </a:lnTo>
-                <a:close/>
-              </a:path>
-            </a:pathLst>
-          </a:custGeom>
-          <a:noFill/>
-          <a:ln w="12700" cap="flat" cmpd="sng">
-            <a:solidFill>
-              <a:srgbClr val="000000"/>
-            </a:solidFill>
-            <a:prstDash val="solid"/>
-            <a:round/>
-            <a:headEnd type="none" w="sm" len="sm"/>
-            <a:tailEnd type="none" w="sm" len="sm"/>
-          </a:ln>
-        </p:spPr>
-      </p:sp>
-      <p:sp>
-        <p:nvSpPr>
-          <p:cNvPr id="995" name="Google Shape;995;p8:notes"/>
-          <p:cNvSpPr txBox="1">
-            <a:spLocks noGrp="1"/>
-          </p:cNvSpPr>
-          <p:nvPr>
-            <p:ph type="body" idx="1"/>
-          </p:nvPr>
-        </p:nvSpPr>
-        <p:spPr>
-          <a:xfrm>
-            <a:off x="685800" y="4400550"/>
-            <a:ext cx="5486400" cy="3600450"/>
-          </a:xfrm>
-          <a:prstGeom prst="rect">
-            <a:avLst/>
-          </a:prstGeom>
-          <a:noFill/>
-          <a:ln>
-            <a:noFill/>
-          </a:ln>
-        </p:spPr>
-        <p:txBody>
-          <a:bodyPr spcFirstLastPara="1" wrap="square" lIns="91425" tIns="45700" rIns="91425" bIns="45700" anchor="t" anchorCtr="0">
-            <a:noAutofit/>
-          </a:bodyPr>
-          <a:lstStyle/>
-          <a:p>
-            <a:pPr marL="0" lvl="0" indent="0" algn="l" rtl="0">
-              <a:lnSpc>
-                <a:spcPct val="100000"/>
-              </a:lnSpc>
-              <a:spcBef>
-                <a:spcPts val="0"/>
-              </a:spcBef>
-              <a:spcAft>
-                <a:spcPts val="0"/>
-              </a:spcAft>
-              <a:buSzPts val="1400"/>
-              <a:buNone/>
-            </a:pPr>
-            <a:r>
-              <a:rPr lang="en-US" b="0" i="0">
-                <a:solidFill>
-                  <a:srgbClr val="F1F2F4"/>
-                </a:solidFill>
-                <a:latin typeface="Inter"/>
-                <a:ea typeface="Inter"/>
-                <a:cs typeface="Inter"/>
-                <a:sym typeface="Inter"/>
-              </a:rPr>
-              <a:t>A Ray cluster consists of a single head node and any number of connected worker nodes</a:t>
-            </a:r>
-            <a:endParaRPr/>
-          </a:p>
-        </p:txBody>
-      </p:sp>
-      <p:sp>
-        <p:nvSpPr>
-          <p:cNvPr id="996" name="Google Shape;996;p8:notes"/>
-          <p:cNvSpPr txBox="1">
-            <a:spLocks noGrp="1"/>
-          </p:cNvSpPr>
-          <p:nvPr>
-            <p:ph type="sldNum" idx="12"/>
-          </p:nvPr>
-        </p:nvSpPr>
-        <p:spPr>
-          <a:xfrm>
-            <a:off x="3884613" y="8685213"/>
-            <a:ext cx="2971800" cy="458787"/>
-          </a:xfrm>
-          <a:prstGeom prst="rect">
-            <a:avLst/>
-          </a:prstGeom>
-          <a:noFill/>
-          <a:ln>
-            <a:noFill/>
-          </a:ln>
-        </p:spPr>
-        <p:txBody>
-          <a:bodyPr spcFirstLastPara="1" wrap="square" lIns="91425" tIns="45700" rIns="91425" bIns="45700" anchor="b" anchorCtr="0">
-            <a:noAutofit/>
-          </a:bodyPr>
-          <a:lstStyle/>
-          <a:p>
-            <a:pPr marL="0" lvl="0" indent="0" algn="r" rtl="0">
-              <a:lnSpc>
-                <a:spcPct val="100000"/>
-              </a:lnSpc>
-              <a:spcBef>
-                <a:spcPts val="0"/>
-              </a:spcBef>
-              <a:spcAft>
-                <a:spcPts val="0"/>
-              </a:spcAft>
-              <a:buSzPts val="1400"/>
-              <a:buNone/>
-            </a:pPr>
-            <a:fld id="{00000000-1234-1234-1234-123412341234}" type="slidenum">
-              <a:rPr lang="en-US"/>
-              <a:t>4</a:t>
-            </a:fld>
-            <a:endParaRPr/>
-          </a:p>
-        </p:txBody>
-      </p:sp>
-    </p:spTree>
-  </p:cSld>
-  <p:clrMapOvr>
-    <a:masterClrMapping/>
-  </p:clrMapOvr>
-</p:notes>
-</file>
-
-<file path=ppt/notesSlides/notesSlide5.xml><?xml version="1.0" encoding="utf-8"?>
-<p:notes xmlns:a="http://schemas.openxmlformats.org/drawingml/2006/main" xmlns:r="http://schemas.openxmlformats.org/officeDocument/2006/relationships" xmlns:p="http://schemas.openxmlformats.org/presentationml/2006/main" showMasterSp="0" showMasterPhAnim="0">
-  <p:cSld>
-    <p:spTree>
-      <p:nvGrpSpPr>
         <p:cNvPr id="1" name="Shape 1002"/>
         <p:cNvGrpSpPr/>
         <p:nvPr/>
@@ -2611,7 +2486,7 @@
 </p:notes>
 </file>
 
-<file path=ppt/notesSlides/notesSlide6.xml><?xml version="1.0" encoding="utf-8"?>
+<file path=ppt/notesSlides/notesSlide5.xml><?xml version="1.0" encoding="utf-8"?>
 <p:notes xmlns:a="http://schemas.openxmlformats.org/drawingml/2006/main" xmlns:r="http://schemas.openxmlformats.org/officeDocument/2006/relationships" xmlns:p="http://schemas.openxmlformats.org/presentationml/2006/main" showMasterSp="0" showMasterPhAnim="0">
   <p:cSld>
     <p:spTree>
@@ -2762,7 +2637,7 @@
 </p:notes>
 </file>
 
-<file path=ppt/notesSlides/notesSlide7.xml><?xml version="1.0" encoding="utf-8"?>
+<file path=ppt/notesSlides/notesSlide6.xml><?xml version="1.0" encoding="utf-8"?>
 <p:notes xmlns:a="http://schemas.openxmlformats.org/drawingml/2006/main" xmlns:r="http://schemas.openxmlformats.org/officeDocument/2006/relationships" xmlns:p="http://schemas.openxmlformats.org/presentationml/2006/main" showMasterSp="0" showMasterPhAnim="0">
   <p:cSld>
     <p:spTree>
@@ -3014,7 +2889,7 @@
 </p:notes>
 </file>
 
-<file path=ppt/notesSlides/notesSlide8.xml><?xml version="1.0" encoding="utf-8"?>
+<file path=ppt/notesSlides/notesSlide7.xml><?xml version="1.0" encoding="utf-8"?>
 <p:notes xmlns:a="http://schemas.openxmlformats.org/drawingml/2006/main" xmlns:r="http://schemas.openxmlformats.org/officeDocument/2006/relationships" xmlns:p="http://schemas.openxmlformats.org/presentationml/2006/main" showMasterSp="0" showMasterPhAnim="0">
   <p:cSld>
     <p:spTree>
@@ -3136,7 +3011,7 @@
 </p:notes>
 </file>
 
-<file path=ppt/notesSlides/notesSlide9.xml><?xml version="1.0" encoding="utf-8"?>
+<file path=ppt/notesSlides/notesSlide8.xml><?xml version="1.0" encoding="utf-8"?>
 <p:notes xmlns:a="http://schemas.openxmlformats.org/drawingml/2006/main" xmlns:r="http://schemas.openxmlformats.org/officeDocument/2006/relationships" xmlns:p="http://schemas.openxmlformats.org/presentationml/2006/main" showMasterSp="0" showMasterPhAnim="0">
   <p:cSld>
     <p:spTree>
@@ -3202,6 +3077,128 @@
       <p:sp>
         <p:nvSpPr>
           <p:cNvPr id="1043" name="Google Shape;1043;p15:notes"/>
+          <p:cNvSpPr>
+            <a:spLocks noGrp="1" noRot="1" noChangeAspect="1"/>
+          </p:cNvSpPr>
+          <p:nvPr>
+            <p:ph type="sldImg" idx="2"/>
+          </p:nvPr>
+        </p:nvSpPr>
+        <p:spPr>
+          <a:xfrm>
+            <a:off x="685800" y="1143000"/>
+            <a:ext cx="5486400" cy="3086100"/>
+          </a:xfrm>
+          <a:custGeom>
+            <a:avLst/>
+            <a:gdLst/>
+            <a:ahLst/>
+            <a:cxnLst/>
+            <a:rect l="l" t="t" r="r" b="b"/>
+            <a:pathLst>
+              <a:path w="120000" h="120000" extrusionOk="0">
+                <a:moveTo>
+                  <a:pt x="0" y="0"/>
+                </a:moveTo>
+                <a:lnTo>
+                  <a:pt x="120000" y="0"/>
+                </a:lnTo>
+                <a:lnTo>
+                  <a:pt x="120000" y="120000"/>
+                </a:lnTo>
+                <a:lnTo>
+                  <a:pt x="0" y="120000"/>
+                </a:lnTo>
+                <a:close/>
+              </a:path>
+            </a:pathLst>
+          </a:custGeom>
+          <a:noFill/>
+          <a:ln w="12700" cap="flat" cmpd="sng">
+            <a:solidFill>
+              <a:srgbClr val="000000"/>
+            </a:solidFill>
+            <a:prstDash val="solid"/>
+            <a:round/>
+            <a:headEnd type="none" w="sm" len="sm"/>
+            <a:tailEnd type="none" w="sm" len="sm"/>
+          </a:ln>
+        </p:spPr>
+      </p:sp>
+    </p:spTree>
+  </p:cSld>
+  <p:clrMapOvr>
+    <a:masterClrMapping/>
+  </p:clrMapOvr>
+</p:notes>
+</file>
+
+<file path=ppt/notesSlides/notesSlide9.xml><?xml version="1.0" encoding="utf-8"?>
+<p:notes xmlns:a="http://schemas.openxmlformats.org/drawingml/2006/main" xmlns:r="http://schemas.openxmlformats.org/officeDocument/2006/relationships" xmlns:p="http://schemas.openxmlformats.org/presentationml/2006/main" showMasterSp="0" showMasterPhAnim="0">
+  <p:cSld>
+    <p:spTree>
+      <p:nvGrpSpPr>
+        <p:cNvPr id="1" name="Shape 1047"/>
+        <p:cNvGrpSpPr/>
+        <p:nvPr/>
+      </p:nvGrpSpPr>
+      <p:grpSpPr>
+        <a:xfrm>
+          <a:off x="0" y="0"/>
+          <a:ext cx="0" cy="0"/>
+          <a:chOff x="0" y="0"/>
+          <a:chExt cx="0" cy="0"/>
+        </a:xfrm>
+      </p:grpSpPr>
+      <p:sp>
+        <p:nvSpPr>
+          <p:cNvPr id="1048" name="Google Shape;1048;p13:notes"/>
+          <p:cNvSpPr txBox="1">
+            <a:spLocks noGrp="1"/>
+          </p:cNvSpPr>
+          <p:nvPr>
+            <p:ph type="body" idx="1"/>
+          </p:nvPr>
+        </p:nvSpPr>
+        <p:spPr>
+          <a:xfrm>
+            <a:off x="685800" y="4400550"/>
+            <a:ext cx="5486400" cy="3600450"/>
+          </a:xfrm>
+          <a:prstGeom prst="rect">
+            <a:avLst/>
+          </a:prstGeom>
+          <a:noFill/>
+          <a:ln>
+            <a:noFill/>
+          </a:ln>
+        </p:spPr>
+        <p:txBody>
+          <a:bodyPr spcFirstLastPara="1" wrap="square" lIns="91425" tIns="45700" rIns="91425" bIns="45700" anchor="t" anchorCtr="0">
+            <a:noAutofit/>
+          </a:bodyPr>
+          <a:lstStyle/>
+          <a:p>
+            <a:pPr marL="0" lvl="0" indent="0" algn="l" rtl="0">
+              <a:lnSpc>
+                <a:spcPct val="100000"/>
+              </a:lnSpc>
+              <a:spcBef>
+                <a:spcPts val="0"/>
+              </a:spcBef>
+              <a:spcAft>
+                <a:spcPts val="0"/>
+              </a:spcAft>
+              <a:buSzPts val="1400"/>
+              <a:buNone/>
+            </a:pPr>
+            <a:endParaRPr/>
+          </a:p>
+        </p:txBody>
+      </p:sp>
+      <p:sp>
+        <p:nvSpPr>
+          <p:cNvPr id="1049" name="Google Shape;1049;p13:notes"/>
           <p:cNvSpPr>
             <a:spLocks noGrp="1" noRot="1" noChangeAspect="1"/>
           </p:cNvSpPr>
@@ -30602,10 +30599,10 @@
               <a:buNone/>
             </a:pPr>
             <a:r>
-              <a:rPr lang="en-US"/>
+              <a:rPr lang="en-US" dirty="0"/>
               <a:t>Bhagirathi Hegde</a:t>
             </a:r>
-            <a:endParaRPr/>
+            <a:endParaRPr dirty="0"/>
           </a:p>
           <a:p>
             <a:pPr marL="457200" lvl="0" indent="-228600" algn="ctr" rtl="0">
@@ -30625,10 +30622,10 @@
               <a:buNone/>
             </a:pPr>
             <a:r>
-              <a:rPr lang="en-US"/>
+              <a:rPr lang="en-US" dirty="0"/>
               <a:t>Sarath Srinivas</a:t>
             </a:r>
-            <a:endParaRPr/>
+            <a:endParaRPr dirty="0"/>
           </a:p>
         </p:txBody>
       </p:sp>
@@ -31327,7 +31324,7 @@
         </p:spPr>
         <p:txBody>
           <a:bodyPr spcFirstLastPara="1" wrap="square" lIns="91425" tIns="45700" rIns="91425" bIns="45700" anchor="ctr" anchorCtr="0">
-            <a:normAutofit lnSpcReduction="20000"/>
+            <a:normAutofit fontScale="92500"/>
           </a:bodyPr>
           <a:lstStyle/>
           <a:p>
@@ -31483,6 +31480,269 @@
 </p:sld>
 </file>
 
+<file path=ppt/slides/slide12.xml><?xml version="1.0" encoding="utf-8"?>
+<p:sld xmlns:a="http://schemas.openxmlformats.org/drawingml/2006/main" xmlns:r="http://schemas.openxmlformats.org/officeDocument/2006/relationships" xmlns:p="http://schemas.openxmlformats.org/presentationml/2006/main" show="0">
+  <p:cSld>
+    <p:bg>
+      <p:bgPr>
+        <a:gradFill>
+          <a:gsLst>
+            <a:gs pos="0">
+              <a:srgbClr val="EAE8E8"/>
+            </a:gs>
+            <a:gs pos="50000">
+              <a:srgbClr val="E3E1E1"/>
+            </a:gs>
+            <a:gs pos="100000">
+              <a:srgbClr val="BBB9B9"/>
+            </a:gs>
+          </a:gsLst>
+          <a:lin ang="5400000" scaled="0"/>
+        </a:gradFill>
+        <a:effectLst/>
+      </p:bgPr>
+    </p:bg>
+    <p:spTree>
+      <p:nvGrpSpPr>
+        <p:cNvPr id="1" name="Shape 997"/>
+        <p:cNvGrpSpPr/>
+        <p:nvPr/>
+      </p:nvGrpSpPr>
+      <p:grpSpPr>
+        <a:xfrm>
+          <a:off x="0" y="0"/>
+          <a:ext cx="0" cy="0"/>
+          <a:chOff x="0" y="0"/>
+          <a:chExt cx="0" cy="0"/>
+        </a:xfrm>
+      </p:grpSpPr>
+      <p:sp>
+        <p:nvSpPr>
+          <p:cNvPr id="998" name="Google Shape;998;p8"/>
+          <p:cNvSpPr/>
+          <p:nvPr/>
+        </p:nvSpPr>
+        <p:spPr>
+          <a:xfrm>
+            <a:off x="953311" y="953311"/>
+            <a:ext cx="10603149" cy="5263867"/>
+          </a:xfrm>
+          <a:prstGeom prst="roundRect">
+            <a:avLst>
+              <a:gd name="adj" fmla="val 1566"/>
+            </a:avLst>
+          </a:prstGeom>
+          <a:solidFill>
+            <a:srgbClr val="FFFFFF"/>
+          </a:solidFill>
+          <a:ln>
+            <a:noFill/>
+          </a:ln>
+        </p:spPr>
+        <p:txBody>
+          <a:bodyPr spcFirstLastPara="1" wrap="square" lIns="91425" tIns="45700" rIns="91425" bIns="45700" anchor="ctr" anchorCtr="0">
+            <a:noAutofit/>
+          </a:bodyPr>
+          <a:lstStyle/>
+          <a:p>
+            <a:pPr marL="0" marR="0" lvl="0" indent="0" algn="ctr" rtl="0">
+              <a:lnSpc>
+                <a:spcPct val="100000"/>
+              </a:lnSpc>
+              <a:spcBef>
+                <a:spcPts val="0"/>
+              </a:spcBef>
+              <a:spcAft>
+                <a:spcPts val="0"/>
+              </a:spcAft>
+              <a:buClr>
+                <a:srgbClr val="000000"/>
+              </a:buClr>
+              <a:buSzPts val="1400"/>
+              <a:buFont typeface="Arial"/>
+              <a:buNone/>
+            </a:pPr>
+            <a:r>
+              <a:rPr lang="en-US" sz="1400" b="0" i="0" u="none" strike="noStrike" cap="none">
+                <a:solidFill>
+                  <a:schemeClr val="lt1"/>
+                </a:solidFill>
+                <a:latin typeface="Arial"/>
+                <a:ea typeface="Arial"/>
+                <a:cs typeface="Arial"/>
+                <a:sym typeface="Arial"/>
+              </a:rPr>
+              <a:t>S</a:t>
+            </a:r>
+            <a:endParaRPr sz="1400" b="0" i="0" u="none" strike="noStrike" cap="none">
+              <a:solidFill>
+                <a:schemeClr val="lt1"/>
+              </a:solidFill>
+              <a:latin typeface="Arial"/>
+              <a:ea typeface="Arial"/>
+              <a:cs typeface="Arial"/>
+              <a:sym typeface="Arial"/>
+            </a:endParaRPr>
+          </a:p>
+        </p:txBody>
+      </p:sp>
+      <p:sp>
+        <p:nvSpPr>
+          <p:cNvPr id="999" name="Google Shape;999;p8"/>
+          <p:cNvSpPr txBox="1">
+            <a:spLocks noGrp="1"/>
+          </p:cNvSpPr>
+          <p:nvPr>
+            <p:ph type="title"/>
+          </p:nvPr>
+        </p:nvSpPr>
+        <p:spPr>
+          <a:xfrm>
+            <a:off x="640080" y="640080"/>
+            <a:ext cx="2752354" cy="2709275"/>
+          </a:xfrm>
+          <a:prstGeom prst="rect">
+            <a:avLst/>
+          </a:prstGeom>
+          <a:solidFill>
+            <a:srgbClr val="373B6F"/>
+          </a:solidFill>
+          <a:ln w="9525" cap="flat" cmpd="sng">
+            <a:solidFill>
+              <a:srgbClr val="373B6F"/>
+            </a:solidFill>
+            <a:prstDash val="solid"/>
+            <a:round/>
+            <a:headEnd type="none" w="sm" len="sm"/>
+            <a:tailEnd type="none" w="sm" len="sm"/>
+          </a:ln>
+        </p:spPr>
+        <p:txBody>
+          <a:bodyPr spcFirstLastPara="1" wrap="square" lIns="91425" tIns="45700" rIns="91425" bIns="45700" anchor="ctr" anchorCtr="0">
+            <a:normAutofit/>
+          </a:bodyPr>
+          <a:lstStyle/>
+          <a:p>
+            <a:pPr marL="0" lvl="0" indent="0" algn="ctr" rtl="0">
+              <a:lnSpc>
+                <a:spcPct val="90000"/>
+              </a:lnSpc>
+              <a:spcBef>
+                <a:spcPts val="0"/>
+              </a:spcBef>
+              <a:spcAft>
+                <a:spcPts val="0"/>
+              </a:spcAft>
+              <a:buClr>
+                <a:schemeClr val="dk1"/>
+              </a:buClr>
+              <a:buSzPts val="4400"/>
+              <a:buNone/>
+            </a:pPr>
+            <a:r>
+              <a:rPr lang="en-US" sz="2800">
+                <a:solidFill>
+                  <a:srgbClr val="FFFFFF"/>
+                </a:solidFill>
+                <a:latin typeface="Arial"/>
+                <a:ea typeface="Arial"/>
+                <a:cs typeface="Arial"/>
+                <a:sym typeface="Arial"/>
+              </a:rPr>
+              <a:t>Ray cluster</a:t>
+            </a:r>
+            <a:endParaRPr/>
+          </a:p>
+        </p:txBody>
+      </p:sp>
+      <p:pic>
+        <p:nvPicPr>
+          <p:cNvPr id="1000" name="Google Shape;1000;p8" descr="A screenshot of a computer&#10;&#10;Description automatically generated"/>
+          <p:cNvPicPr preferRelativeResize="0"/>
+          <p:nvPr/>
+        </p:nvPicPr>
+        <p:blipFill rotWithShape="1">
+          <a:blip r:embed="rId3">
+            <a:alphaModFix/>
+          </a:blip>
+          <a:srcRect/>
+          <a:stretch/>
+        </p:blipFill>
+        <p:spPr>
+          <a:xfrm>
+            <a:off x="4110665" y="1663057"/>
+            <a:ext cx="6804078" cy="3844303"/>
+          </a:xfrm>
+          <a:prstGeom prst="rect">
+            <a:avLst/>
+          </a:prstGeom>
+          <a:noFill/>
+          <a:ln>
+            <a:noFill/>
+          </a:ln>
+        </p:spPr>
+      </p:pic>
+      <p:sp>
+        <p:nvSpPr>
+          <p:cNvPr id="1001" name="Google Shape;1001;p8"/>
+          <p:cNvSpPr txBox="1"/>
+          <p:nvPr/>
+        </p:nvSpPr>
+        <p:spPr>
+          <a:xfrm>
+            <a:off x="4930907" y="5507360"/>
+            <a:ext cx="5163593" cy="276999"/>
+          </a:xfrm>
+          <a:prstGeom prst="rect">
+            <a:avLst/>
+          </a:prstGeom>
+          <a:noFill/>
+          <a:ln>
+            <a:noFill/>
+          </a:ln>
+        </p:spPr>
+        <p:txBody>
+          <a:bodyPr spcFirstLastPara="1" wrap="square" lIns="91425" tIns="45700" rIns="91425" bIns="45700" anchor="t" anchorCtr="0">
+            <a:spAutoFit/>
+          </a:bodyPr>
+          <a:lstStyle/>
+          <a:p>
+            <a:pPr marL="0" marR="0" lvl="0" indent="0" algn="l" rtl="0">
+              <a:lnSpc>
+                <a:spcPct val="100000"/>
+              </a:lnSpc>
+              <a:spcBef>
+                <a:spcPts val="0"/>
+              </a:spcBef>
+              <a:spcAft>
+                <a:spcPts val="0"/>
+              </a:spcAft>
+              <a:buNone/>
+            </a:pPr>
+            <a:r>
+              <a:rPr lang="en-US" sz="1200" b="0" i="0" u="none" strike="noStrike" cap="none">
+                <a:solidFill>
+                  <a:srgbClr val="000000"/>
+                </a:solidFill>
+                <a:latin typeface="Arial"/>
+                <a:ea typeface="Arial"/>
+                <a:cs typeface="Arial"/>
+                <a:sym typeface="Arial"/>
+              </a:rPr>
+              <a:t>Source: https://docs.ray.io/en/latest/cluster/key-concepts.html#ray-cluster</a:t>
+            </a:r>
+            <a:endParaRPr/>
+          </a:p>
+        </p:txBody>
+      </p:sp>
+    </p:spTree>
+  </p:cSld>
+  <p:clrMapOvr>
+    <a:masterClrMapping/>
+  </p:clrMapOvr>
+</p:sld>
+</file>
+
 <file path=ppt/slides/slide2.xml><?xml version="1.0" encoding="utf-8"?>
 <p:sld xmlns:a="http://schemas.openxmlformats.org/drawingml/2006/main" xmlns:r="http://schemas.openxmlformats.org/officeDocument/2006/relationships" xmlns:p="http://schemas.openxmlformats.org/presentationml/2006/main">
   <p:cSld>
@@ -31999,269 +32259,6 @@
 <file path=ppt/slides/slide4.xml><?xml version="1.0" encoding="utf-8"?>
 <p:sld xmlns:a="http://schemas.openxmlformats.org/drawingml/2006/main" xmlns:r="http://schemas.openxmlformats.org/officeDocument/2006/relationships" xmlns:p="http://schemas.openxmlformats.org/presentationml/2006/main">
   <p:cSld>
-    <p:bg>
-      <p:bgPr>
-        <a:gradFill>
-          <a:gsLst>
-            <a:gs pos="0">
-              <a:srgbClr val="EAE8E8"/>
-            </a:gs>
-            <a:gs pos="50000">
-              <a:srgbClr val="E3E1E1"/>
-            </a:gs>
-            <a:gs pos="100000">
-              <a:srgbClr val="BBB9B9"/>
-            </a:gs>
-          </a:gsLst>
-          <a:lin ang="5400000" scaled="0"/>
-        </a:gradFill>
-        <a:effectLst/>
-      </p:bgPr>
-    </p:bg>
-    <p:spTree>
-      <p:nvGrpSpPr>
-        <p:cNvPr id="1" name="Shape 997"/>
-        <p:cNvGrpSpPr/>
-        <p:nvPr/>
-      </p:nvGrpSpPr>
-      <p:grpSpPr>
-        <a:xfrm>
-          <a:off x="0" y="0"/>
-          <a:ext cx="0" cy="0"/>
-          <a:chOff x="0" y="0"/>
-          <a:chExt cx="0" cy="0"/>
-        </a:xfrm>
-      </p:grpSpPr>
-      <p:sp>
-        <p:nvSpPr>
-          <p:cNvPr id="998" name="Google Shape;998;p8"/>
-          <p:cNvSpPr/>
-          <p:nvPr/>
-        </p:nvSpPr>
-        <p:spPr>
-          <a:xfrm>
-            <a:off x="953311" y="953311"/>
-            <a:ext cx="10603149" cy="5263867"/>
-          </a:xfrm>
-          <a:prstGeom prst="roundRect">
-            <a:avLst>
-              <a:gd name="adj" fmla="val 1566"/>
-            </a:avLst>
-          </a:prstGeom>
-          <a:solidFill>
-            <a:srgbClr val="FFFFFF"/>
-          </a:solidFill>
-          <a:ln>
-            <a:noFill/>
-          </a:ln>
-        </p:spPr>
-        <p:txBody>
-          <a:bodyPr spcFirstLastPara="1" wrap="square" lIns="91425" tIns="45700" rIns="91425" bIns="45700" anchor="ctr" anchorCtr="0">
-            <a:noAutofit/>
-          </a:bodyPr>
-          <a:lstStyle/>
-          <a:p>
-            <a:pPr marL="0" marR="0" lvl="0" indent="0" algn="ctr" rtl="0">
-              <a:lnSpc>
-                <a:spcPct val="100000"/>
-              </a:lnSpc>
-              <a:spcBef>
-                <a:spcPts val="0"/>
-              </a:spcBef>
-              <a:spcAft>
-                <a:spcPts val="0"/>
-              </a:spcAft>
-              <a:buClr>
-                <a:srgbClr val="000000"/>
-              </a:buClr>
-              <a:buSzPts val="1400"/>
-              <a:buFont typeface="Arial"/>
-              <a:buNone/>
-            </a:pPr>
-            <a:r>
-              <a:rPr lang="en-US" sz="1400" b="0" i="0" u="none" strike="noStrike" cap="none">
-                <a:solidFill>
-                  <a:schemeClr val="lt1"/>
-                </a:solidFill>
-                <a:latin typeface="Arial"/>
-                <a:ea typeface="Arial"/>
-                <a:cs typeface="Arial"/>
-                <a:sym typeface="Arial"/>
-              </a:rPr>
-              <a:t>S</a:t>
-            </a:r>
-            <a:endParaRPr sz="1400" b="0" i="0" u="none" strike="noStrike" cap="none">
-              <a:solidFill>
-                <a:schemeClr val="lt1"/>
-              </a:solidFill>
-              <a:latin typeface="Arial"/>
-              <a:ea typeface="Arial"/>
-              <a:cs typeface="Arial"/>
-              <a:sym typeface="Arial"/>
-            </a:endParaRPr>
-          </a:p>
-        </p:txBody>
-      </p:sp>
-      <p:sp>
-        <p:nvSpPr>
-          <p:cNvPr id="999" name="Google Shape;999;p8"/>
-          <p:cNvSpPr txBox="1">
-            <a:spLocks noGrp="1"/>
-          </p:cNvSpPr>
-          <p:nvPr>
-            <p:ph type="title"/>
-          </p:nvPr>
-        </p:nvSpPr>
-        <p:spPr>
-          <a:xfrm>
-            <a:off x="640080" y="640080"/>
-            <a:ext cx="2752354" cy="2709275"/>
-          </a:xfrm>
-          <a:prstGeom prst="rect">
-            <a:avLst/>
-          </a:prstGeom>
-          <a:solidFill>
-            <a:srgbClr val="373B6F"/>
-          </a:solidFill>
-          <a:ln w="9525" cap="flat" cmpd="sng">
-            <a:solidFill>
-              <a:srgbClr val="373B6F"/>
-            </a:solidFill>
-            <a:prstDash val="solid"/>
-            <a:round/>
-            <a:headEnd type="none" w="sm" len="sm"/>
-            <a:tailEnd type="none" w="sm" len="sm"/>
-          </a:ln>
-        </p:spPr>
-        <p:txBody>
-          <a:bodyPr spcFirstLastPara="1" wrap="square" lIns="91425" tIns="45700" rIns="91425" bIns="45700" anchor="ctr" anchorCtr="0">
-            <a:normAutofit/>
-          </a:bodyPr>
-          <a:lstStyle/>
-          <a:p>
-            <a:pPr marL="0" lvl="0" indent="0" algn="ctr" rtl="0">
-              <a:lnSpc>
-                <a:spcPct val="90000"/>
-              </a:lnSpc>
-              <a:spcBef>
-                <a:spcPts val="0"/>
-              </a:spcBef>
-              <a:spcAft>
-                <a:spcPts val="0"/>
-              </a:spcAft>
-              <a:buClr>
-                <a:schemeClr val="dk1"/>
-              </a:buClr>
-              <a:buSzPts val="4400"/>
-              <a:buNone/>
-            </a:pPr>
-            <a:r>
-              <a:rPr lang="en-US" sz="2800">
-                <a:solidFill>
-                  <a:srgbClr val="FFFFFF"/>
-                </a:solidFill>
-                <a:latin typeface="Arial"/>
-                <a:ea typeface="Arial"/>
-                <a:cs typeface="Arial"/>
-                <a:sym typeface="Arial"/>
-              </a:rPr>
-              <a:t>Ray cluster</a:t>
-            </a:r>
-            <a:endParaRPr/>
-          </a:p>
-        </p:txBody>
-      </p:sp>
-      <p:pic>
-        <p:nvPicPr>
-          <p:cNvPr id="1000" name="Google Shape;1000;p8" descr="A screenshot of a computer&#10;&#10;Description automatically generated"/>
-          <p:cNvPicPr preferRelativeResize="0"/>
-          <p:nvPr/>
-        </p:nvPicPr>
-        <p:blipFill rotWithShape="1">
-          <a:blip r:embed="rId3">
-            <a:alphaModFix/>
-          </a:blip>
-          <a:srcRect/>
-          <a:stretch/>
-        </p:blipFill>
-        <p:spPr>
-          <a:xfrm>
-            <a:off x="4110665" y="1663057"/>
-            <a:ext cx="6804078" cy="3844303"/>
-          </a:xfrm>
-          <a:prstGeom prst="rect">
-            <a:avLst/>
-          </a:prstGeom>
-          <a:noFill/>
-          <a:ln>
-            <a:noFill/>
-          </a:ln>
-        </p:spPr>
-      </p:pic>
-      <p:sp>
-        <p:nvSpPr>
-          <p:cNvPr id="1001" name="Google Shape;1001;p8"/>
-          <p:cNvSpPr txBox="1"/>
-          <p:nvPr/>
-        </p:nvSpPr>
-        <p:spPr>
-          <a:xfrm>
-            <a:off x="4930907" y="5507360"/>
-            <a:ext cx="5163593" cy="276999"/>
-          </a:xfrm>
-          <a:prstGeom prst="rect">
-            <a:avLst/>
-          </a:prstGeom>
-          <a:noFill/>
-          <a:ln>
-            <a:noFill/>
-          </a:ln>
-        </p:spPr>
-        <p:txBody>
-          <a:bodyPr spcFirstLastPara="1" wrap="square" lIns="91425" tIns="45700" rIns="91425" bIns="45700" anchor="t" anchorCtr="0">
-            <a:spAutoFit/>
-          </a:bodyPr>
-          <a:lstStyle/>
-          <a:p>
-            <a:pPr marL="0" marR="0" lvl="0" indent="0" algn="l" rtl="0">
-              <a:lnSpc>
-                <a:spcPct val="100000"/>
-              </a:lnSpc>
-              <a:spcBef>
-                <a:spcPts val="0"/>
-              </a:spcBef>
-              <a:spcAft>
-                <a:spcPts val="0"/>
-              </a:spcAft>
-              <a:buNone/>
-            </a:pPr>
-            <a:r>
-              <a:rPr lang="en-US" sz="1200" b="0" i="0" u="none" strike="noStrike" cap="none">
-                <a:solidFill>
-                  <a:srgbClr val="000000"/>
-                </a:solidFill>
-                <a:latin typeface="Arial"/>
-                <a:ea typeface="Arial"/>
-                <a:cs typeface="Arial"/>
-                <a:sym typeface="Arial"/>
-              </a:rPr>
-              <a:t>Source: https://docs.ray.io/en/latest/cluster/key-concepts.html#ray-cluster</a:t>
-            </a:r>
-            <a:endParaRPr/>
-          </a:p>
-        </p:txBody>
-      </p:sp>
-    </p:spTree>
-  </p:cSld>
-  <p:clrMapOvr>
-    <a:masterClrMapping/>
-  </p:clrMapOvr>
-</p:sld>
-</file>
-
-<file path=ppt/slides/slide5.xml><?xml version="1.0" encoding="utf-8"?>
-<p:sld xmlns:a="http://schemas.openxmlformats.org/drawingml/2006/main" xmlns:r="http://schemas.openxmlformats.org/officeDocument/2006/relationships" xmlns:p="http://schemas.openxmlformats.org/presentationml/2006/main">
-  <p:cSld>
     <p:spTree>
       <p:nvGrpSpPr>
         <p:cNvPr id="1" name="Shape 1005"/>
@@ -32304,6 +32301,66 @@
         </p:spPr>
       </p:pic>
     </p:spTree>
+  </p:cSld>
+  <p:clrMapOvr>
+    <a:masterClrMapping/>
+  </p:clrMapOvr>
+</p:sld>
+</file>
+
+<file path=ppt/slides/slide5.xml><?xml version="1.0" encoding="utf-8"?>
+<p:sld xmlns:a="http://schemas.openxmlformats.org/drawingml/2006/main" xmlns:r="http://schemas.openxmlformats.org/officeDocument/2006/relationships" xmlns:p="http://schemas.openxmlformats.org/presentationml/2006/main">
+  <p:cSld>
+    <p:spTree>
+      <p:nvGrpSpPr>
+        <p:cNvPr id="1" name=""/>
+        <p:cNvGrpSpPr/>
+        <p:nvPr/>
+      </p:nvGrpSpPr>
+      <p:grpSpPr>
+        <a:xfrm>
+          <a:off x="0" y="0"/>
+          <a:ext cx="0" cy="0"/>
+          <a:chOff x="0" y="0"/>
+          <a:chExt cx="0" cy="0"/>
+        </a:xfrm>
+      </p:grpSpPr>
+      <p:pic>
+        <p:nvPicPr>
+          <p:cNvPr id="5" name="Picture 4" descr="A diagram of a function&#10;&#10;AI-generated content may be incorrect.">
+            <a:extLst>
+              <a:ext uri="{FF2B5EF4-FFF2-40B4-BE49-F238E27FC236}">
+                <a16:creationId xmlns:a16="http://schemas.microsoft.com/office/drawing/2014/main" id="{58FF8C91-7193-206A-E0B8-8D39B9CCFCF2}"/>
+              </a:ext>
+            </a:extLst>
+          </p:cNvPr>
+          <p:cNvPicPr>
+            <a:picLocks noChangeAspect="1"/>
+          </p:cNvPicPr>
+          <p:nvPr/>
+        </p:nvPicPr>
+        <p:blipFill>
+          <a:blip r:embed="rId2"/>
+          <a:stretch>
+            <a:fillRect/>
+          </a:stretch>
+        </p:blipFill>
+        <p:spPr>
+          <a:xfrm>
+            <a:off x="2239045" y="119921"/>
+            <a:ext cx="7579512" cy="6613842"/>
+          </a:xfrm>
+          <a:prstGeom prst="rect">
+            <a:avLst/>
+          </a:prstGeom>
+        </p:spPr>
+      </p:pic>
+    </p:spTree>
+    <p:extLst>
+      <p:ext uri="{BB962C8B-B14F-4D97-AF65-F5344CB8AC3E}">
+        <p14:creationId xmlns:p14="http://schemas.microsoft.com/office/powerpoint/2010/main" val="184174932"/>
+      </p:ext>
+    </p:extLst>
   </p:cSld>
   <p:clrMapOvr>
     <a:masterClrMapping/>

</xml_diff>